<commit_message>
powerpoint is almost finished
</commit_message>
<xml_diff>
--- a/Rust.pptx
+++ b/Rust.pptx
@@ -10505,8 +10505,13 @@
           <a:p>
             <a:r>
               <a:rPr lang="en-US" dirty="0"/>
-              <a:t>Voted “most loved programing language” in Stack Overflow’s annual developer survey since 2016.</a:t>
-            </a:r>
+              <a:t>Voted “most loved programing language” in Stack Overflow’s annual developer survey since </a:t>
+            </a:r>
+            <a:r>
+              <a:rPr lang="en-US"/>
+              <a:t>2016. </a:t>
+            </a:r>
+            <a:endParaRPr lang="en-US" dirty="0"/>
           </a:p>
         </p:txBody>
       </p:sp>

</xml_diff>

<commit_message>
rust pptx updated after first run through
</commit_message>
<xml_diff>
--- a/Rust.pptx
+++ b/Rust.pptx
@@ -7944,14 +7944,42 @@
           </a:bodyPr>
           <a:lstStyle/>
           <a:p>
-            <a:pPr>
+            <a:pPr marL="342900" indent="-342900">
               <a:lnSpc>
                 <a:spcPct val="100000"/>
               </a:lnSpc>
+              <a:buFont typeface="Arial" panose="020B0604020202020204" pitchFamily="34" charset="0"/>
+              <a:buChar char="•"/>
             </a:pPr>
             <a:r>
               <a:rPr lang="en-US" sz="2000" dirty="0"/>
-              <a:t>Function parameters must have types associated with them. There are no optional or variadic functions in Rust. The </a:t>
+              <a:t>Function parameters must have types associated with them. </a:t>
+            </a:r>
+          </a:p>
+          <a:p>
+            <a:pPr marL="342900" indent="-342900">
+              <a:lnSpc>
+                <a:spcPct val="100000"/>
+              </a:lnSpc>
+              <a:buFont typeface="Arial" panose="020B0604020202020204" pitchFamily="34" charset="0"/>
+              <a:buChar char="•"/>
+            </a:pPr>
+            <a:r>
+              <a:rPr lang="en-US" sz="2000" dirty="0"/>
+              <a:t>There are no optional parameters or variadic functions in Rust. </a:t>
+            </a:r>
+          </a:p>
+          <a:p>
+            <a:pPr marL="342900" indent="-342900">
+              <a:lnSpc>
+                <a:spcPct val="100000"/>
+              </a:lnSpc>
+              <a:buFont typeface="Arial" panose="020B0604020202020204" pitchFamily="34" charset="0"/>
+              <a:buChar char="•"/>
+            </a:pPr>
+            <a:r>
+              <a:rPr lang="en-US" sz="2000" dirty="0"/>
+              <a:t>Either the </a:t>
             </a:r>
             <a:r>
               <a:rPr lang="en-US" sz="2000" dirty="0">
@@ -7963,7 +7991,20 @@
             </a:r>
             <a:r>
               <a:rPr lang="en-US" sz="2000" dirty="0"/>
-              <a:t> keyword can still be used if you don’t like the no-semicolon return syntax. The return value of a function is indicated after the </a:t>
+              <a:t> keyword or a statement with no semicolon can be used to indicate return value</a:t>
+            </a:r>
+          </a:p>
+          <a:p>
+            <a:pPr marL="342900" indent="-342900">
+              <a:lnSpc>
+                <a:spcPct val="100000"/>
+              </a:lnSpc>
+              <a:buFont typeface="Arial" panose="020B0604020202020204" pitchFamily="34" charset="0"/>
+              <a:buChar char="•"/>
+            </a:pPr>
+            <a:r>
+              <a:rPr lang="en-US" sz="2000" dirty="0"/>
+              <a:t>The return type of a function is indicated after the </a:t>
             </a:r>
             <a:r>
               <a:rPr lang="en-US" sz="2000" dirty="0">
@@ -7971,7 +8012,22 @@
                 <a:ea typeface="Hack" panose="020B0609030202020204" pitchFamily="49" charset="0"/>
                 <a:cs typeface="Hack" panose="020B0609030202020204" pitchFamily="49" charset="0"/>
               </a:rPr>
-              <a:t>-&gt;.</a:t>
+              <a:t>-&gt; </a:t>
+            </a:r>
+            <a:r>
+              <a:rPr lang="en-US" sz="2000" dirty="0">
+                <a:ea typeface="Hack" panose="020B0609030202020204" pitchFamily="49" charset="0"/>
+                <a:cs typeface="Hack" panose="020B0609030202020204" pitchFamily="49" charset="0"/>
+              </a:rPr>
+              <a:t>in the function declaration</a:t>
+            </a:r>
+            <a:r>
+              <a:rPr lang="en-US" sz="2000" dirty="0">
+                <a:latin typeface="Hack" panose="020B0609030202020204" pitchFamily="49" charset="0"/>
+                <a:ea typeface="Hack" panose="020B0609030202020204" pitchFamily="49" charset="0"/>
+                <a:cs typeface="Hack" panose="020B0609030202020204" pitchFamily="49" charset="0"/>
+              </a:rPr>
+              <a:t>.</a:t>
             </a:r>
             <a:endParaRPr lang="en-US" sz="2000" dirty="0"/>
           </a:p>
@@ -8008,8 +8064,8 @@
         </p:blipFill>
         <p:spPr bwMode="auto">
           <a:xfrm>
-            <a:off x="5528368" y="3005873"/>
-            <a:ext cx="3924502" cy="2260716"/>
+            <a:off x="5528367" y="3005873"/>
+            <a:ext cx="4454899" cy="2566252"/>
           </a:xfrm>
           <a:prstGeom prst="rect">
             <a:avLst/>
@@ -8115,8 +8171,8 @@
         </p:blipFill>
         <p:spPr bwMode="auto">
           <a:xfrm>
-            <a:off x="1645038" y="2336800"/>
-            <a:ext cx="7685899" cy="3598863"/>
+            <a:off x="1832648" y="2336800"/>
+            <a:ext cx="8526703" cy="3992563"/>
           </a:xfrm>
           <a:prstGeom prst="rect">
             <a:avLst/>
@@ -8215,8 +8271,8 @@
         </p:blipFill>
         <p:spPr>
           <a:xfrm>
-            <a:off x="4880285" y="3015445"/>
-            <a:ext cx="6515483" cy="2242170"/>
+            <a:off x="4769986" y="3044020"/>
+            <a:ext cx="7097270" cy="2442380"/>
           </a:xfrm>
         </p:spPr>
       </p:pic>
@@ -8245,7 +8301,7 @@
           <a:p>
             <a:r>
               <a:rPr lang="en-US" sz="2000" dirty="0"/>
-              <a:t>Conditionals in Rust are standard to C-like syntax. One difference is that it does not require parentheses around conditions.</a:t>
+              <a:t>Conditionals in Rust are standard to C-like syntax. One difference is that it does not require parentheses around conditional statements. </a:t>
             </a:r>
           </a:p>
         </p:txBody>
@@ -8324,13 +8380,13 @@
             <p:ph idx="1"/>
             <p:extLst>
               <p:ext uri="{D42A27DB-BD31-4B8C-83A1-F6EECF244321}">
-                <p14:modId xmlns:p14="http://schemas.microsoft.com/office/powerpoint/2010/main" val="3363906732"/>
+                <p14:modId xmlns:p14="http://schemas.microsoft.com/office/powerpoint/2010/main" val="2452814824"/>
               </p:ext>
             </p:extLst>
           </p:nvPr>
         </p:nvGraphicFramePr>
         <p:xfrm>
-          <a:off x="681038" y="2336800"/>
+          <a:off x="1289050" y="2308225"/>
           <a:ext cx="9613899" cy="4079240"/>
         </p:xfrm>
         <a:graphic>
@@ -8904,13 +8960,13 @@
             <p:ph idx="1"/>
             <p:extLst>
               <p:ext uri="{D42A27DB-BD31-4B8C-83A1-F6EECF244321}">
-                <p14:modId xmlns:p14="http://schemas.microsoft.com/office/powerpoint/2010/main" val="3456462707"/>
+                <p14:modId xmlns:p14="http://schemas.microsoft.com/office/powerpoint/2010/main" val="40032053"/>
               </p:ext>
             </p:extLst>
           </p:nvPr>
         </p:nvGraphicFramePr>
         <p:xfrm>
-          <a:off x="681038" y="2336800"/>
+          <a:off x="1289050" y="2522538"/>
           <a:ext cx="9613899" cy="3364498"/>
         </p:xfrm>
         <a:graphic>
@@ -9543,8 +9599,8 @@
         </p:blipFill>
         <p:spPr bwMode="auto">
           <a:xfrm>
-            <a:off x="5034029" y="2508738"/>
-            <a:ext cx="6234481" cy="3424168"/>
+            <a:off x="4948304" y="2508737"/>
+            <a:ext cx="6860326" cy="3767901"/>
           </a:xfrm>
           <a:prstGeom prst="rect">
             <a:avLst/>
@@ -9835,7 +9891,19 @@
             </a:pPr>
             <a:r>
               <a:rPr lang="en-US" sz="2000" dirty="0"/>
-              <a:t>A more involved example of mutability is coming later.</a:t>
+              <a:t>In general, to declare something mutable, use the </a:t>
+            </a:r>
+            <a:r>
+              <a:rPr lang="en-US" sz="2000" dirty="0">
+                <a:latin typeface="Hack" panose="020B0609030202020204" pitchFamily="49" charset="0"/>
+                <a:ea typeface="Hack" panose="020B0609030202020204" pitchFamily="49" charset="0"/>
+                <a:cs typeface="Hack" panose="020B0609030202020204" pitchFamily="49" charset="0"/>
+              </a:rPr>
+              <a:t>mut</a:t>
+            </a:r>
+            <a:r>
+              <a:rPr lang="en-US" sz="2000" dirty="0"/>
+              <a:t> keyword.</a:t>
             </a:r>
           </a:p>
         </p:txBody>
@@ -10773,7 +10841,7 @@
           <a:p>
             <a:r>
               <a:rPr lang="en-US" sz="2000" dirty="0"/>
-              <a:t>Structs are declared in a global scope as shown above. To access fields with the dot syntax, they must be declared as public with </a:t>
+              <a:t>Structs are declared in a global scope as shown to the right. To access fields with the dot syntax, they must be declared as public with </a:t>
             </a:r>
             <a:r>
               <a:rPr lang="en-US" sz="2000" dirty="0">
@@ -11202,7 +11270,7 @@
         </p:nvSpPr>
         <p:spPr>
           <a:xfrm>
-            <a:off x="5614090" y="2100988"/>
+            <a:off x="6297056" y="2100988"/>
             <a:ext cx="4474028" cy="692076"/>
           </a:xfrm>
         </p:spPr>
@@ -11241,7 +11309,7 @@
         </p:nvSpPr>
         <p:spPr>
           <a:xfrm>
-            <a:off x="5614995" y="2780184"/>
+            <a:off x="6297056" y="2797580"/>
             <a:ext cx="4700059" cy="2906179"/>
           </a:xfrm>
         </p:spPr>
@@ -11270,35 +11338,6 @@
           </a:p>
         </p:txBody>
       </p:sp>
-      <p:pic>
-        <p:nvPicPr>
-          <p:cNvPr id="11" name="Picture 10">
-            <a:extLst>
-              <a:ext uri="{FF2B5EF4-FFF2-40B4-BE49-F238E27FC236}">
-                <a16:creationId xmlns:a16="http://schemas.microsoft.com/office/drawing/2014/main" id="{7016BD26-EC4F-41D8-AC0F-AF76CB146DCB}"/>
-              </a:ext>
-            </a:extLst>
-          </p:cNvPr>
-          <p:cNvPicPr>
-            <a:picLocks noChangeAspect="1"/>
-          </p:cNvPicPr>
-          <p:nvPr/>
-        </p:nvPicPr>
-        <p:blipFill rotWithShape="1">
-          <a:blip r:embed="rId2"/>
-          <a:srcRect t="11010" b="7264"/>
-          <a:stretch/>
-        </p:blipFill>
-        <p:spPr>
-          <a:xfrm>
-            <a:off x="6916360" y="4816929"/>
-            <a:ext cx="1918547" cy="869434"/>
-          </a:xfrm>
-          <a:prstGeom prst="rect">
-            <a:avLst/>
-          </a:prstGeom>
-        </p:spPr>
-      </p:pic>
       <p:pic>
         <p:nvPicPr>
           <p:cNvPr id="13" name="Picture 12">
@@ -11314,15 +11353,15 @@
           <p:nvPr/>
         </p:nvPicPr>
         <p:blipFill>
-          <a:blip r:embed="rId3"/>
+          <a:blip r:embed="rId2"/>
           <a:stretch>
             <a:fillRect/>
           </a:stretch>
         </p:blipFill>
         <p:spPr>
           <a:xfrm>
-            <a:off x="442706" y="5696829"/>
-            <a:ext cx="5123907" cy="669501"/>
+            <a:off x="391497" y="5699243"/>
+            <a:ext cx="5704503" cy="745363"/>
           </a:xfrm>
           <a:prstGeom prst="rect">
             <a:avLst/>
@@ -11344,14 +11383,14 @@
           <p:nvPr/>
         </p:nvPicPr>
         <p:blipFill rotWithShape="1">
-          <a:blip r:embed="rId4"/>
+          <a:blip r:embed="rId3"/>
           <a:srcRect b="7527"/>
           <a:stretch/>
         </p:blipFill>
         <p:spPr>
           <a:xfrm>
-            <a:off x="5810297" y="5771636"/>
-            <a:ext cx="4220164" cy="669501"/>
+            <a:off x="6395921" y="5665697"/>
+            <a:ext cx="4698354" cy="745363"/>
           </a:xfrm>
           <a:prstGeom prst="rect">
             <a:avLst/>
@@ -13747,13 +13786,34 @@
         </p:nvSpPr>
         <p:spPr>
           <a:xfrm>
-            <a:off x="680321" y="2351160"/>
-            <a:ext cx="9613861" cy="3599316"/>
+            <a:off x="680321" y="2314575"/>
+            <a:ext cx="9613861" cy="3635901"/>
           </a:xfrm>
         </p:spPr>
         <p:txBody>
           <a:bodyPr/>
           <a:lstStyle/>
+          <a:p>
+            <a:pPr marL="0" indent="0" algn="ctr">
+              <a:buNone/>
+            </a:pPr>
+            <a:endParaRPr lang="en-US" sz="3200" dirty="0"/>
+          </a:p>
+          <a:p>
+            <a:pPr marL="0" indent="0" algn="ctr">
+              <a:buNone/>
+            </a:pPr>
+            <a:r>
+              <a:rPr lang="en-US" sz="3200" dirty="0"/>
+              <a:t>Thank you for your time. </a:t>
+            </a:r>
+          </a:p>
+          <a:p>
+            <a:pPr marL="0" indent="0">
+              <a:buNone/>
+            </a:pPr>
+            <a:endParaRPr lang="en-US" dirty="0"/>
+          </a:p>
           <a:p>
             <a:r>
               <a:rPr lang="en-US" dirty="0"/>
@@ -14139,8 +14199,12 @@
               <a:buNone/>
             </a:pPr>
             <a:r>
+              <a:rPr lang="en-US"/>
+              <a:t>Rust </a:t>
+            </a:r>
+            <a:r>
               <a:rPr lang="en-US" dirty="0"/>
-              <a:t>Despite its age, Rust is an up-and-coming language with a passionate following in many areas of computing.</a:t>
+              <a:t>is an up-and-coming language with a passionate following in many areas of computing.</a:t>
             </a:r>
           </a:p>
           <a:p>
@@ -14247,7 +14311,7 @@
           <a:p>
             <a:r>
               <a:rPr lang="en-US" dirty="0"/>
-              <a:t>Memory management inspired C++</a:t>
+              <a:t>OOP elements inspired by C++ </a:t>
             </a:r>
           </a:p>
         </p:txBody>
@@ -14333,7 +14397,9 @@
           </a:xfrm>
         </p:spPr>
         <p:txBody>
-          <a:bodyPr/>
+          <a:bodyPr>
+            <a:normAutofit/>
+          </a:bodyPr>
           <a:lstStyle/>
           <a:p>
             <a:r>
@@ -14344,16 +14410,11 @@
           <a:p>
             <a:r>
               <a:rPr lang="en-US" dirty="0"/>
-              <a:t>Classes removed in 0.4 in favor of structs with associated methods</a:t>
-            </a:r>
-          </a:p>
-          <a:p>
-            <a:r>
-              <a:rPr lang="en-US" dirty="0"/>
-              <a:t>Traits added in 0.4 to add a sort of polymorphism</a:t>
-            </a:r>
-          </a:p>
-          <a:p>
+              <a:t>Classes removed in 0.4 in favor of structs and traits </a:t>
+            </a:r>
+          </a:p>
+          <a:p>
+            <a:pPr lvl="1"/>
             <a:r>
               <a:rPr lang="en-US" dirty="0"/>
               <a:t>These and other changes in the mid 2010s slowed adoption</a:t>
@@ -14374,7 +14435,7 @@
           <a:p>
             <a:r>
               <a:rPr lang="en-US" dirty="0"/>
-              <a:t>Rust Foundation created in February 2021 to ensure financial stability and longevity </a:t>
+              <a:t>Rust Foundation created in February 2021 to ensure financial stability and longevity (Founders: AWS, Huawei, Google, Microsoft, Mozilla). </a:t>
             </a:r>
           </a:p>
         </p:txBody>
@@ -14473,28 +14534,16 @@
           <a:p>
             <a:pPr lvl="1"/>
             <a:r>
-              <a:rPr lang="en-US" sz="1600" dirty="0"/>
-              <a:t>Used by Facebook, Microsoft, Dropbox, Amazon, Discord</a:t>
-            </a:r>
-          </a:p>
-          <a:p>
-            <a:r>
-              <a:rPr lang="en-US" sz="2800" dirty="0"/>
-              <a:t>High performance web server and frameworks</a:t>
-            </a:r>
-          </a:p>
-          <a:p>
-            <a:pPr lvl="1"/>
-            <a:r>
               <a:rPr lang="en-US" sz="1800" dirty="0"/>
-              <a:t>Actix Web: an extremely performant web server</a:t>
-            </a:r>
-          </a:p>
-          <a:p>
-            <a:r>
-              <a:rPr lang="en-US" sz="2800" dirty="0"/>
+              <a:t>Used by Facebook, Microsoft, Dropbox, Amazon, Discord and more</a:t>
+            </a:r>
+          </a:p>
+          <a:p>
+            <a:r>
+              <a:rPr lang="en-US" sz="2800" dirty="0" err="1"/>
               <a:t>WebAssembly</a:t>
             </a:r>
+            <a:endParaRPr lang="en-US" sz="2800" dirty="0"/>
           </a:p>
           <a:p>
             <a:pPr lvl="1"/>
@@ -14515,11 +14564,11 @@
           <a:p>
             <a:pPr lvl="1"/>
             <a:r>
-              <a:rPr lang="en-US" sz="1900" dirty="0" err="1"/>
+              <a:rPr lang="en-US" sz="1800" dirty="0" err="1"/>
               <a:t>Veloren</a:t>
             </a:r>
             <a:r>
-              <a:rPr lang="en-US" sz="1900" dirty="0"/>
+              <a:rPr lang="en-US" sz="1800" dirty="0"/>
               <a:t>, a free and open source voxel Minecraft-clone</a:t>
             </a:r>
           </a:p>
@@ -14773,6 +14822,42 @@
               <a:buChar char="•"/>
             </a:pPr>
             <a:r>
+              <a:rPr lang="en-US" sz="2000" dirty="0">
+                <a:latin typeface="Hack" panose="020B0609030202020204" pitchFamily="49" charset="0"/>
+                <a:ea typeface="Hack" panose="020B0609030202020204" pitchFamily="49" charset="0"/>
+                <a:cs typeface="Hack" panose="020B0609030202020204" pitchFamily="49" charset="0"/>
+              </a:rPr>
+              <a:t>main</a:t>
+            </a:r>
+            <a:r>
+              <a:rPr lang="en-US" sz="2000" dirty="0">
+                <a:latin typeface="+mj-lt"/>
+                <a:ea typeface="Hack" panose="020B0609030202020204" pitchFamily="49" charset="0"/>
+                <a:cs typeface="Hack" panose="020B0609030202020204" pitchFamily="49" charset="0"/>
+              </a:rPr>
+              <a:t> is a special entry-point function</a:t>
+            </a:r>
+          </a:p>
+          <a:p>
+            <a:pPr marL="285750" indent="-285750">
+              <a:buFont typeface="Arial" panose="020B0604020202020204" pitchFamily="34" charset="0"/>
+              <a:buChar char="•"/>
+            </a:pPr>
+            <a:r>
+              <a:rPr lang="en-US" sz="2000" dirty="0">
+                <a:latin typeface="+mj-lt"/>
+                <a:ea typeface="Hack" panose="020B0609030202020204" pitchFamily="49" charset="0"/>
+                <a:cs typeface="Hack" panose="020B0609030202020204" pitchFamily="49" charset="0"/>
+              </a:rPr>
+              <a:t>All statements end with semicolon </a:t>
+            </a:r>
+          </a:p>
+          <a:p>
+            <a:pPr marL="285750" indent="-285750">
+              <a:buFont typeface="Arial" panose="020B0604020202020204" pitchFamily="34" charset="0"/>
+              <a:buChar char="•"/>
+            </a:pPr>
+            <a:r>
               <a:rPr lang="en-US" sz="2000" dirty="0" err="1">
                 <a:latin typeface="Hack" panose="020B0609030202020204" pitchFamily="49" charset="0"/>
                 <a:ea typeface="Hack" panose="020B0609030202020204" pitchFamily="49" charset="0"/>
@@ -14786,7 +14871,6 @@
             </a:r>
             <a:r>
               <a:rPr lang="en-US" sz="2000" dirty="0">
-                <a:latin typeface="+mj-lt"/>
                 <a:ea typeface="Hack" panose="020B0609030202020204" pitchFamily="49" charset="0"/>
                 <a:cs typeface="Hack" panose="020B0609030202020204" pitchFamily="49" charset="0"/>
               </a:rPr>
@@ -14801,74 +14885,40 @@
               <a:t>!</a:t>
             </a:r>
           </a:p>
-          <a:p>
-            <a:pPr marL="285750" indent="-285750">
-              <a:buFont typeface="Arial" panose="020B0604020202020204" pitchFamily="34" charset="0"/>
-              <a:buChar char="•"/>
-            </a:pPr>
-            <a:r>
-              <a:rPr lang="en-US" sz="2000" dirty="0">
-                <a:latin typeface="Hack" panose="020B0609030202020204" pitchFamily="49" charset="0"/>
-                <a:ea typeface="Hack" panose="020B0609030202020204" pitchFamily="49" charset="0"/>
-                <a:cs typeface="Hack" panose="020B0609030202020204" pitchFamily="49" charset="0"/>
-              </a:rPr>
-              <a:t>main</a:t>
-            </a:r>
-            <a:r>
-              <a:rPr lang="en-US" sz="2000" dirty="0">
-                <a:latin typeface="+mj-lt"/>
-                <a:ea typeface="Hack" panose="020B0609030202020204" pitchFamily="49" charset="0"/>
-                <a:cs typeface="Hack" panose="020B0609030202020204" pitchFamily="49" charset="0"/>
-              </a:rPr>
-              <a:t> is a special entry-point function</a:t>
-            </a:r>
-          </a:p>
-          <a:p>
-            <a:pPr marL="285750" indent="-285750">
-              <a:buFont typeface="Arial" panose="020B0604020202020204" pitchFamily="34" charset="0"/>
-              <a:buChar char="•"/>
-            </a:pPr>
-            <a:r>
-              <a:rPr lang="en-US" sz="2000" dirty="0">
-                <a:latin typeface="+mj-lt"/>
-                <a:ea typeface="Hack" panose="020B0609030202020204" pitchFamily="49" charset="0"/>
-                <a:cs typeface="Hack" panose="020B0609030202020204" pitchFamily="49" charset="0"/>
-              </a:rPr>
-              <a:t>Whitespace-ambivalent</a:t>
-            </a:r>
-          </a:p>
-          <a:p>
-            <a:pPr marL="285750" indent="-285750">
-              <a:buFont typeface="Arial" panose="020B0604020202020204" pitchFamily="34" charset="0"/>
-              <a:buChar char="•"/>
-            </a:pPr>
-            <a:r>
-              <a:rPr lang="en-US" sz="2000" dirty="0">
-                <a:latin typeface="+mj-lt"/>
-                <a:ea typeface="Hack" panose="020B0609030202020204" pitchFamily="49" charset="0"/>
-                <a:cs typeface="Hack" panose="020B0609030202020204" pitchFamily="49" charset="0"/>
-              </a:rPr>
-              <a:t>All statements end with semicolon </a:t>
-            </a:r>
-          </a:p>
-          <a:p>
-            <a:pPr marL="285750" indent="-285750">
-              <a:buFont typeface="Arial" panose="020B0604020202020204" pitchFamily="34" charset="0"/>
-              <a:buChar char="•"/>
-            </a:pPr>
-            <a:r>
-              <a:rPr lang="en-US" sz="2000" dirty="0">
-                <a:latin typeface="+mj-lt"/>
-                <a:ea typeface="Hack" panose="020B0609030202020204" pitchFamily="49" charset="0"/>
-                <a:cs typeface="Hack" panose="020B0609030202020204" pitchFamily="49" charset="0"/>
-              </a:rPr>
-              <a:t>Return statement has no semicolon</a:t>
-            </a:r>
-            <a:endParaRPr lang="en-US" sz="2000" dirty="0">
-              <a:latin typeface="Hack" panose="020B0609030202020204" pitchFamily="49" charset="0"/>
-              <a:ea typeface="Hack" panose="020B0609030202020204" pitchFamily="49" charset="0"/>
-              <a:cs typeface="Hack" panose="020B0609030202020204" pitchFamily="49" charset="0"/>
-            </a:endParaRPr>
+        </p:txBody>
+      </p:sp>
+      <p:sp>
+        <p:nvSpPr>
+          <p:cNvPr id="2" name="TextBox 1">
+            <a:extLst>
+              <a:ext uri="{FF2B5EF4-FFF2-40B4-BE49-F238E27FC236}">
+                <a16:creationId xmlns:a16="http://schemas.microsoft.com/office/drawing/2014/main" id="{3A2CB5D1-AE5C-E64F-8AC4-8AF64DBAAEAB}"/>
+              </a:ext>
+            </a:extLst>
+          </p:cNvPr>
+          <p:cNvSpPr txBox="1"/>
+          <p:nvPr/>
+        </p:nvSpPr>
+        <p:spPr>
+          <a:xfrm>
+            <a:off x="9901233" y="3871909"/>
+            <a:ext cx="250067" cy="369332"/>
+          </a:xfrm>
+          <a:prstGeom prst="rect">
+            <a:avLst/>
+          </a:prstGeom>
+          <a:noFill/>
+        </p:spPr>
+        <p:txBody>
+          <a:bodyPr wrap="square" rtlCol="0">
+            <a:spAutoFit/>
+          </a:bodyPr>
+          <a:lstStyle/>
+          <a:p>
+            <a:r>
+              <a:rPr lang="en-US" dirty="0"/>
+              <a:t>;</a:t>
+            </a:r>
           </a:p>
         </p:txBody>
       </p:sp>

</xml_diff>

<commit_message>
rust pptx updated after second run through
</commit_message>
<xml_diff>
--- a/Rust.pptx
+++ b/Rust.pptx
@@ -13431,7 +13431,7 @@
           <a:p>
             <a:r>
               <a:rPr lang="en-US" sz="2000" dirty="0"/>
-              <a:t>Shows all public information associated with the </a:t>
+              <a:t>Shows almost all public information associated with the </a:t>
             </a:r>
             <a:r>
               <a:rPr lang="en-US" sz="2000" dirty="0" err="1"/>
@@ -13560,7 +13560,15 @@
           <a:p>
             <a:r>
               <a:rPr lang="en-US" dirty="0"/>
-              <a:t>Rust feels closes to C++ in syntax and developer experience, which is not really a compliment for Rust as C++ development is often very painful. However, you can know that your compiled code will work more or less as you expected, unlike C++.</a:t>
+              <a:t>Rust </a:t>
+            </a:r>
+            <a:r>
+              <a:rPr lang="en-US"/>
+              <a:t>feels closest </a:t>
+            </a:r>
+            <a:r>
+              <a:rPr lang="en-US" dirty="0"/>
+              <a:t>to C++ in syntax and developer experience, which is not really a compliment for Rust as C++ development is often very painful. However, you can know that your compiled code will work more or less as you expected, unlike C++.</a:t>
             </a:r>
           </a:p>
           <a:p>
@@ -14150,7 +14158,12 @@
             <p:ph idx="1"/>
           </p:nvPr>
         </p:nvSpPr>
-        <p:spPr/>
+        <p:spPr>
+          <a:xfrm>
+            <a:off x="680321" y="2236860"/>
+            <a:ext cx="9992442" cy="3599316"/>
+          </a:xfrm>
+        </p:spPr>
         <p:txBody>
           <a:bodyPr>
             <a:normAutofit fontScale="85000" lnSpcReduction="10000"/>
@@ -14164,7 +14177,7 @@
             </a:pPr>
             <a:r>
               <a:rPr lang="en-US" sz="2900" dirty="0"/>
-              <a:t>There was a gap to fill for a highly concurrent, truly strongly typed low-level language with a safe memory layout. </a:t>
+              <a:t>Before Rust, there was a gap to fill for a highly concurrent, truly strongly typed low-level language with a safe memory layout. </a:t>
             </a:r>
           </a:p>
           <a:p>

</xml_diff>